<commit_message>
update answer of chap8 and chap9
</commit_message>
<xml_diff>
--- a/answer-of-textbook/image/chapter8/chapter8-image.pptx
+++ b/answer-of-textbook/image/chapter8/chapter8-image.pptx
@@ -3526,7 +3526,7 @@
         <p:spPr>
           <a:xfrm>
             <a:off x="5973226" y="3778623"/>
-            <a:ext cx="999074" cy="1592788"/>
+            <a:ext cx="299430" cy="477371"/>
           </a:xfrm>
           <a:prstGeom prst="line">
             <a:avLst/>
@@ -3677,8 +3677,8 @@
         </p:nvCxnSpPr>
         <p:spPr>
           <a:xfrm flipH="1" flipV="1">
-            <a:off x="3462619" y="1398494"/>
-            <a:ext cx="1055593" cy="1022301"/>
+            <a:off x="2951629" y="903620"/>
+            <a:ext cx="1566584" cy="1517176"/>
           </a:xfrm>
           <a:prstGeom prst="line">
             <a:avLst/>
@@ -3717,6 +3717,44 @@
           <a:xfrm flipV="1">
             <a:off x="5856194" y="369794"/>
             <a:ext cx="1304365" cy="1647266"/>
+          </a:xfrm>
+          <a:prstGeom prst="line">
+            <a:avLst/>
+          </a:prstGeom>
+        </p:spPr>
+        <p:style>
+          <a:lnRef idx="1">
+            <a:schemeClr val="accent1"/>
+          </a:lnRef>
+          <a:fillRef idx="0">
+            <a:schemeClr val="accent1"/>
+          </a:fillRef>
+          <a:effectRef idx="0">
+            <a:schemeClr val="accent1"/>
+          </a:effectRef>
+          <a:fontRef idx="minor">
+            <a:schemeClr val="tx1"/>
+          </a:fontRef>
+        </p:style>
+      </p:cxnSp>
+      <p:cxnSp>
+        <p:nvCxnSpPr>
+          <p:cNvPr id="14" name="直接连接符 13">
+            <a:extLst>
+              <a:ext uri="{FF2B5EF4-FFF2-40B4-BE49-F238E27FC236}">
+                <a16:creationId xmlns:a16="http://schemas.microsoft.com/office/drawing/2014/main" id="{BD97131F-FA45-42CC-BE66-C3C02F7EDF06}"/>
+              </a:ext>
+            </a:extLst>
+          </p:cNvPr>
+          <p:cNvCxnSpPr>
+            <a:cxnSpLocks/>
+          </p:cNvCxnSpPr>
+          <p:nvPr/>
+        </p:nvCxnSpPr>
+        <p:spPr>
+          <a:xfrm>
+            <a:off x="6272657" y="4255994"/>
+            <a:ext cx="1882984" cy="1385047"/>
           </a:xfrm>
           <a:prstGeom prst="line">
             <a:avLst/>

</xml_diff>